<commit_message>
úprava popisu nastavení kódování
</commit_message>
<xml_diff>
--- a/05-sql-databaze/05-prezentace-phpmyadmin.pptx
+++ b/05-sql-databaze/05-prezentace-phpmyadmin.pptx
@@ -143,6 +143,11 @@
       </a:defRPr>
     </a:lvl9pPr>
   </p:defaultTextStyle>
+  <p:extLst>
+    <p:ext uri="{EFAFB233-063F-42B5-8137-9DF3F51BA10A}">
+      <p15:sldGuideLst xmlns:p15="http://schemas.microsoft.com/office/powerpoint/2012/main"/>
+    </p:ext>
+  </p:extLst>
 </p:presentation>
 </file>
 
@@ -295,7 +300,7 @@
           <a:p>
             <a:fld id="{83867D71-9844-470F-AC9F-FDA455409775}" type="datetimeFigureOut">
               <a:rPr lang="en-US" smtClean="0"/>
-              <a:t>3/21/2020</a:t>
+              <a:t>3/25/2020</a:t>
             </a:fld>
             <a:endParaRPr lang="en-US"/>
           </a:p>
@@ -495,7 +500,7 @@
           <a:p>
             <a:fld id="{83867D71-9844-470F-AC9F-FDA455409775}" type="datetimeFigureOut">
               <a:rPr lang="en-US" smtClean="0"/>
-              <a:t>3/21/2020</a:t>
+              <a:t>3/25/2020</a:t>
             </a:fld>
             <a:endParaRPr lang="en-US"/>
           </a:p>
@@ -705,7 +710,7 @@
           <a:p>
             <a:fld id="{83867D71-9844-470F-AC9F-FDA455409775}" type="datetimeFigureOut">
               <a:rPr lang="en-US" smtClean="0"/>
-              <a:t>3/21/2020</a:t>
+              <a:t>3/25/2020</a:t>
             </a:fld>
             <a:endParaRPr lang="en-US"/>
           </a:p>
@@ -905,7 +910,7 @@
           <a:p>
             <a:fld id="{83867D71-9844-470F-AC9F-FDA455409775}" type="datetimeFigureOut">
               <a:rPr lang="en-US" smtClean="0"/>
-              <a:t>3/21/2020</a:t>
+              <a:t>3/25/2020</a:t>
             </a:fld>
             <a:endParaRPr lang="en-US"/>
           </a:p>
@@ -1181,7 +1186,7 @@
           <a:p>
             <a:fld id="{83867D71-9844-470F-AC9F-FDA455409775}" type="datetimeFigureOut">
               <a:rPr lang="en-US" smtClean="0"/>
-              <a:t>3/21/2020</a:t>
+              <a:t>3/25/2020</a:t>
             </a:fld>
             <a:endParaRPr lang="en-US"/>
           </a:p>
@@ -1449,7 +1454,7 @@
           <a:p>
             <a:fld id="{83867D71-9844-470F-AC9F-FDA455409775}" type="datetimeFigureOut">
               <a:rPr lang="en-US" smtClean="0"/>
-              <a:t>3/21/2020</a:t>
+              <a:t>3/25/2020</a:t>
             </a:fld>
             <a:endParaRPr lang="en-US"/>
           </a:p>
@@ -1864,7 +1869,7 @@
           <a:p>
             <a:fld id="{83867D71-9844-470F-AC9F-FDA455409775}" type="datetimeFigureOut">
               <a:rPr lang="en-US" smtClean="0"/>
-              <a:t>3/21/2020</a:t>
+              <a:t>3/25/2020</a:t>
             </a:fld>
             <a:endParaRPr lang="en-US"/>
           </a:p>
@@ -2006,7 +2011,7 @@
           <a:p>
             <a:fld id="{83867D71-9844-470F-AC9F-FDA455409775}" type="datetimeFigureOut">
               <a:rPr lang="en-US" smtClean="0"/>
-              <a:t>3/21/2020</a:t>
+              <a:t>3/25/2020</a:t>
             </a:fld>
             <a:endParaRPr lang="en-US"/>
           </a:p>
@@ -2119,7 +2124,7 @@
           <a:p>
             <a:fld id="{83867D71-9844-470F-AC9F-FDA455409775}" type="datetimeFigureOut">
               <a:rPr lang="en-US" smtClean="0"/>
-              <a:t>3/21/2020</a:t>
+              <a:t>3/25/2020</a:t>
             </a:fld>
             <a:endParaRPr lang="en-US"/>
           </a:p>
@@ -2432,7 +2437,7 @@
           <a:p>
             <a:fld id="{83867D71-9844-470F-AC9F-FDA455409775}" type="datetimeFigureOut">
               <a:rPr lang="en-US" smtClean="0"/>
-              <a:t>3/21/2020</a:t>
+              <a:t>3/25/2020</a:t>
             </a:fld>
             <a:endParaRPr lang="en-US"/>
           </a:p>
@@ -2721,7 +2726,7 @@
           <a:p>
             <a:fld id="{83867D71-9844-470F-AC9F-FDA455409775}" type="datetimeFigureOut">
               <a:rPr lang="en-US" smtClean="0"/>
-              <a:t>3/21/2020</a:t>
+              <a:t>3/25/2020</a:t>
             </a:fld>
             <a:endParaRPr lang="en-US"/>
           </a:p>
@@ -2964,7 +2969,7 @@
           <a:p>
             <a:fld id="{83867D71-9844-470F-AC9F-FDA455409775}" type="datetimeFigureOut">
               <a:rPr lang="en-US" smtClean="0"/>
-              <a:t>3/21/2020</a:t>
+              <a:t>3/25/2020</a:t>
             </a:fld>
             <a:endParaRPr lang="en-US"/>
           </a:p>
@@ -11151,7 +11156,7 @@
         <p:spPr>
           <a:xfrm>
             <a:off x="2781300" y="3429000"/>
-            <a:ext cx="8324022" cy="923330"/>
+            <a:ext cx="8324022" cy="1384995"/>
           </a:xfrm>
           <a:prstGeom prst="rect">
             <a:avLst/>
@@ -11181,19 +11186,14 @@
           <a:p>
             <a:r>
               <a:rPr lang="cs-CZ" dirty="0"/>
-              <a:t>Vyberte si kódování utf8mb4, nebo utf8.</a:t>
-            </a:r>
-            <a:r>
+              <a:t>Vyberte si kódování utf8mb4.</a:t>
+            </a:r>
+            <a:br>
               <a:rPr lang="cs-CZ" sz="1600" dirty="0"/>
-              <a:t> (z pohledu </a:t>
-            </a:r>
-            <a:r>
-              <a:rPr lang="cs-CZ" sz="1600" dirty="0" err="1"/>
-              <a:t>MariaDB</a:t>
-            </a:r>
+            </a:br>
             <a:r>
               <a:rPr lang="cs-CZ" sz="1600" dirty="0"/>
-              <a:t> je utf8mb4 novějším kódování)</a:t>
+              <a:t>(jde o plnohodnotnou sadu UTF-8, starší kódování zde označené jako „utf8“ nepodporuje některé nové znaky – např. smajlíky)</a:t>
             </a:r>
           </a:p>
           <a:p>

</xml_diff>